<commit_message>
Editing some buttons on the design
</commit_message>
<xml_diff>
--- a/Godot Project/Concept.pptx
+++ b/Godot Project/Concept.pptx
@@ -271,7 +271,7 @@
           <a:p>
             <a:fld id="{0E6B98C6-4E2D-4493-BB6F-B0B550CAA038}" type="datetimeFigureOut">
               <a:rPr lang="en-US" smtClean="0"/>
-              <a:t>8/13/2024</a:t>
+              <a:t>8/24/2024</a:t>
             </a:fld>
             <a:endParaRPr lang="en-US"/>
           </a:p>
@@ -469,7 +469,7 @@
           <a:p>
             <a:fld id="{0E6B98C6-4E2D-4493-BB6F-B0B550CAA038}" type="datetimeFigureOut">
               <a:rPr lang="en-US" smtClean="0"/>
-              <a:t>8/13/2024</a:t>
+              <a:t>8/24/2024</a:t>
             </a:fld>
             <a:endParaRPr lang="en-US"/>
           </a:p>
@@ -677,7 +677,7 @@
           <a:p>
             <a:fld id="{0E6B98C6-4E2D-4493-BB6F-B0B550CAA038}" type="datetimeFigureOut">
               <a:rPr lang="en-US" smtClean="0"/>
-              <a:t>8/13/2024</a:t>
+              <a:t>8/24/2024</a:t>
             </a:fld>
             <a:endParaRPr lang="en-US"/>
           </a:p>
@@ -875,7 +875,7 @@
           <a:p>
             <a:fld id="{0E6B98C6-4E2D-4493-BB6F-B0B550CAA038}" type="datetimeFigureOut">
               <a:rPr lang="en-US" smtClean="0"/>
-              <a:t>8/13/2024</a:t>
+              <a:t>8/24/2024</a:t>
             </a:fld>
             <a:endParaRPr lang="en-US"/>
           </a:p>
@@ -1150,7 +1150,7 @@
           <a:p>
             <a:fld id="{0E6B98C6-4E2D-4493-BB6F-B0B550CAA038}" type="datetimeFigureOut">
               <a:rPr lang="en-US" smtClean="0"/>
-              <a:t>8/13/2024</a:t>
+              <a:t>8/24/2024</a:t>
             </a:fld>
             <a:endParaRPr lang="en-US"/>
           </a:p>
@@ -1415,7 +1415,7 @@
           <a:p>
             <a:fld id="{0E6B98C6-4E2D-4493-BB6F-B0B550CAA038}" type="datetimeFigureOut">
               <a:rPr lang="en-US" smtClean="0"/>
-              <a:t>8/13/2024</a:t>
+              <a:t>8/24/2024</a:t>
             </a:fld>
             <a:endParaRPr lang="en-US"/>
           </a:p>
@@ -1827,7 +1827,7 @@
           <a:p>
             <a:fld id="{0E6B98C6-4E2D-4493-BB6F-B0B550CAA038}" type="datetimeFigureOut">
               <a:rPr lang="en-US" smtClean="0"/>
-              <a:t>8/13/2024</a:t>
+              <a:t>8/24/2024</a:t>
             </a:fld>
             <a:endParaRPr lang="en-US"/>
           </a:p>
@@ -1968,7 +1968,7 @@
           <a:p>
             <a:fld id="{0E6B98C6-4E2D-4493-BB6F-B0B550CAA038}" type="datetimeFigureOut">
               <a:rPr lang="en-US" smtClean="0"/>
-              <a:t>8/13/2024</a:t>
+              <a:t>8/24/2024</a:t>
             </a:fld>
             <a:endParaRPr lang="en-US"/>
           </a:p>
@@ -2081,7 +2081,7 @@
           <a:p>
             <a:fld id="{0E6B98C6-4E2D-4493-BB6F-B0B550CAA038}" type="datetimeFigureOut">
               <a:rPr lang="en-US" smtClean="0"/>
-              <a:t>8/13/2024</a:t>
+              <a:t>8/24/2024</a:t>
             </a:fld>
             <a:endParaRPr lang="en-US"/>
           </a:p>
@@ -2392,7 +2392,7 @@
           <a:p>
             <a:fld id="{0E6B98C6-4E2D-4493-BB6F-B0B550CAA038}" type="datetimeFigureOut">
               <a:rPr lang="en-US" smtClean="0"/>
-              <a:t>8/13/2024</a:t>
+              <a:t>8/24/2024</a:t>
             </a:fld>
             <a:endParaRPr lang="en-US"/>
           </a:p>
@@ -2680,7 +2680,7 @@
           <a:p>
             <a:fld id="{0E6B98C6-4E2D-4493-BB6F-B0B550CAA038}" type="datetimeFigureOut">
               <a:rPr lang="en-US" smtClean="0"/>
-              <a:t>8/13/2024</a:t>
+              <a:t>8/24/2024</a:t>
             </a:fld>
             <a:endParaRPr lang="en-US"/>
           </a:p>
@@ -2921,7 +2921,7 @@
           <a:p>
             <a:fld id="{0E6B98C6-4E2D-4493-BB6F-B0B550CAA038}" type="datetimeFigureOut">
               <a:rPr lang="en-US" smtClean="0"/>
-              <a:t>8/13/2024</a:t>
+              <a:t>8/24/2024</a:t>
             </a:fld>
             <a:endParaRPr lang="en-US"/>
           </a:p>
@@ -13062,6 +13062,239 @@
           </a:prstGeom>
         </p:spPr>
       </p:pic>
+      <p:sp>
+        <p:nvSpPr>
+          <p:cNvPr id="5" name="TextBox 4">
+            <a:extLst>
+              <a:ext uri="{FF2B5EF4-FFF2-40B4-BE49-F238E27FC236}">
+                <a16:creationId xmlns:a16="http://schemas.microsoft.com/office/drawing/2014/main" id="{B7110627-2270-B649-03C1-F346A343FAA6}"/>
+              </a:ext>
+            </a:extLst>
+          </p:cNvPr>
+          <p:cNvSpPr txBox="1"/>
+          <p:nvPr/>
+        </p:nvSpPr>
+        <p:spPr>
+          <a:xfrm>
+            <a:off x="1427399" y="5817813"/>
+            <a:ext cx="3279954" cy="461665"/>
+          </a:xfrm>
+          <a:prstGeom prst="rect">
+            <a:avLst/>
+          </a:prstGeom>
+          <a:noFill/>
+        </p:spPr>
+        <p:txBody>
+          <a:bodyPr wrap="square" rtlCol="0">
+            <a:spAutoFit/>
+          </a:bodyPr>
+          <a:lstStyle/>
+          <a:p>
+            <a:r>
+              <a:rPr lang="en-US" sz="2400" dirty="0">
+                <a:ea typeface="ADLaM Display" panose="02010000000000000000" pitchFamily="2" charset="0"/>
+                <a:cs typeface="ADLaM Display" panose="02010000000000000000" pitchFamily="2" charset="0"/>
+              </a:rPr>
+              <a:t>You can contact me on:</a:t>
+            </a:r>
+          </a:p>
+        </p:txBody>
+      </p:sp>
+      <p:pic>
+        <p:nvPicPr>
+          <p:cNvPr id="10" name="Picture 9">
+            <a:extLst>
+              <a:ext uri="{FF2B5EF4-FFF2-40B4-BE49-F238E27FC236}">
+                <a16:creationId xmlns:a16="http://schemas.microsoft.com/office/drawing/2014/main" id="{68FB6436-195C-69BD-6591-0F4CBAB34573}"/>
+              </a:ext>
+            </a:extLst>
+          </p:cNvPr>
+          <p:cNvPicPr>
+            <a:picLocks noChangeAspect="1"/>
+          </p:cNvPicPr>
+          <p:nvPr/>
+        </p:nvPicPr>
+        <p:blipFill>
+          <a:blip r:embed="rId8"/>
+          <a:stretch>
+            <a:fillRect/>
+          </a:stretch>
+        </p:blipFill>
+        <p:spPr>
+          <a:xfrm>
+            <a:off x="4707353" y="5886208"/>
+            <a:ext cx="359284" cy="357768"/>
+          </a:xfrm>
+          <a:prstGeom prst="roundRect">
+            <a:avLst/>
+          </a:prstGeom>
+        </p:spPr>
+      </p:pic>
+      <p:sp>
+        <p:nvSpPr>
+          <p:cNvPr id="14" name="TextBox 13">
+            <a:extLst>
+              <a:ext uri="{FF2B5EF4-FFF2-40B4-BE49-F238E27FC236}">
+                <a16:creationId xmlns:a16="http://schemas.microsoft.com/office/drawing/2014/main" id="{F041C94E-7DF4-BC0F-A6CD-3331ABC60BF3}"/>
+              </a:ext>
+            </a:extLst>
+          </p:cNvPr>
+          <p:cNvSpPr txBox="1"/>
+          <p:nvPr/>
+        </p:nvSpPr>
+        <p:spPr>
+          <a:xfrm>
+            <a:off x="5022033" y="5874540"/>
+            <a:ext cx="1760397" cy="380587"/>
+          </a:xfrm>
+          <a:prstGeom prst="rect">
+            <a:avLst/>
+          </a:prstGeom>
+          <a:noFill/>
+        </p:spPr>
+        <p:txBody>
+          <a:bodyPr wrap="square">
+            <a:spAutoFit/>
+          </a:bodyPr>
+          <a:lstStyle/>
+          <a:p>
+            <a:r>
+              <a:rPr lang="en-US" dirty="0"/>
+              <a:t>@LahbibMajd</a:t>
+            </a:r>
+          </a:p>
+        </p:txBody>
+      </p:sp>
+      <p:pic>
+        <p:nvPicPr>
+          <p:cNvPr id="1026" name="Picture 2" descr="Github Logo Vector Art, Icons, and Graphics for Free Download">
+            <a:extLst>
+              <a:ext uri="{FF2B5EF4-FFF2-40B4-BE49-F238E27FC236}">
+                <a16:creationId xmlns:a16="http://schemas.microsoft.com/office/drawing/2014/main" id="{0F616A23-3C98-7993-1287-37694797286E}"/>
+              </a:ext>
+            </a:extLst>
+          </p:cNvPr>
+          <p:cNvPicPr>
+            <a:picLocks noChangeAspect="1" noChangeArrowheads="1"/>
+          </p:cNvPicPr>
+          <p:nvPr/>
+        </p:nvPicPr>
+        <p:blipFill rotWithShape="1">
+          <a:blip r:embed="rId9">
+            <a:extLst>
+              <a:ext uri="{28A0092B-C50C-407E-A947-70E740481C1C}">
+                <a14:useLocalDpi xmlns:a14="http://schemas.microsoft.com/office/drawing/2010/main" val="0"/>
+              </a:ext>
+            </a:extLst>
+          </a:blip>
+          <a:srcRect l="8865" t="11900" r="59397" b="26860"/>
+          <a:stretch/>
+        </p:blipFill>
+        <p:spPr bwMode="auto">
+          <a:xfrm>
+            <a:off x="6618598" y="5834000"/>
+            <a:ext cx="478512" cy="461665"/>
+          </a:xfrm>
+          <a:prstGeom prst="ellipse">
+            <a:avLst/>
+          </a:prstGeom>
+          <a:noFill/>
+          <a:extLst>
+            <a:ext uri="{909E8E84-426E-40DD-AFC4-6F175D3DCCD1}">
+              <a14:hiddenFill xmlns:a14="http://schemas.microsoft.com/office/drawing/2010/main">
+                <a:solidFill>
+                  <a:srgbClr val="FFFFFF"/>
+                </a:solidFill>
+              </a14:hiddenFill>
+            </a:ext>
+          </a:extLst>
+        </p:spPr>
+      </p:pic>
+      <p:sp>
+        <p:nvSpPr>
+          <p:cNvPr id="17" name="TextBox 16">
+            <a:extLst>
+              <a:ext uri="{FF2B5EF4-FFF2-40B4-BE49-F238E27FC236}">
+                <a16:creationId xmlns:a16="http://schemas.microsoft.com/office/drawing/2014/main" id="{806AFB5D-12E2-D015-6CD9-1A6BC9F6DDF7}"/>
+              </a:ext>
+            </a:extLst>
+          </p:cNvPr>
+          <p:cNvSpPr txBox="1"/>
+          <p:nvPr/>
+        </p:nvSpPr>
+        <p:spPr>
+          <a:xfrm>
+            <a:off x="7052475" y="5902956"/>
+            <a:ext cx="3028228" cy="369332"/>
+          </a:xfrm>
+          <a:prstGeom prst="rect">
+            <a:avLst/>
+          </a:prstGeom>
+          <a:noFill/>
+        </p:spPr>
+        <p:txBody>
+          <a:bodyPr wrap="square">
+            <a:spAutoFit/>
+          </a:bodyPr>
+          <a:lstStyle/>
+          <a:p>
+            <a:r>
+              <a:rPr lang="en-US" dirty="0"/>
+              <a:t>@MajdLHB</a:t>
+            </a:r>
+          </a:p>
+        </p:txBody>
+      </p:sp>
+      <p:sp>
+        <p:nvSpPr>
+          <p:cNvPr id="18" name="Rectangle: Rounded Corners 17">
+            <a:extLst>
+              <a:ext uri="{FF2B5EF4-FFF2-40B4-BE49-F238E27FC236}">
+                <a16:creationId xmlns:a16="http://schemas.microsoft.com/office/drawing/2014/main" id="{70889207-7020-C4C2-6487-60B30EACB117}"/>
+              </a:ext>
+            </a:extLst>
+          </p:cNvPr>
+          <p:cNvSpPr/>
+          <p:nvPr/>
+        </p:nvSpPr>
+        <p:spPr>
+          <a:xfrm>
+            <a:off x="1360469" y="5722071"/>
+            <a:ext cx="8720233" cy="653148"/>
+          </a:xfrm>
+          <a:prstGeom prst="roundRect">
+            <a:avLst/>
+          </a:prstGeom>
+          <a:noFill/>
+          <a:ln w="19050">
+            <a:noFill/>
+          </a:ln>
+        </p:spPr>
+        <p:style>
+          <a:lnRef idx="2">
+            <a:schemeClr val="accent1">
+              <a:shade val="15000"/>
+            </a:schemeClr>
+          </a:lnRef>
+          <a:fillRef idx="1">
+            <a:schemeClr val="accent1"/>
+          </a:fillRef>
+          <a:effectRef idx="0">
+            <a:schemeClr val="accent1"/>
+          </a:effectRef>
+          <a:fontRef idx="minor">
+            <a:schemeClr val="lt1"/>
+          </a:fontRef>
+        </p:style>
+        <p:txBody>
+          <a:bodyPr rtlCol="0" anchor="ctr"/>
+          <a:lstStyle/>
+          <a:p>
+            <a:pPr algn="ctr"/>
+            <a:endParaRPr lang="en-US"/>
+          </a:p>
+        </p:txBody>
+      </p:sp>
     </p:spTree>
     <p:extLst>
       <p:ext uri="{BB962C8B-B14F-4D97-AF65-F5344CB8AC3E}">

</xml_diff>

<commit_message>
Adding the mobile controls
Adding the mobile on screen controls for:
- Moving the box
- Jumping
- Opning pause Menu
</commit_message>
<xml_diff>
--- a/Godot Project/Concept.pptx
+++ b/Godot Project/Concept.pptx
@@ -5,7 +5,7 @@
     <p:sldMasterId id="2147483648" r:id="rId1"/>
   </p:sldMasterIdLst>
   <p:notesMasterIdLst>
-    <p:notesMasterId r:id="rId20"/>
+    <p:notesMasterId r:id="rId21"/>
   </p:notesMasterIdLst>
   <p:sldIdLst>
     <p:sldId id="256" r:id="rId2"/>
@@ -26,6 +26,7 @@
     <p:sldId id="271" r:id="rId17"/>
     <p:sldId id="272" r:id="rId18"/>
     <p:sldId id="273" r:id="rId19"/>
+    <p:sldId id="274" r:id="rId20"/>
   </p:sldIdLst>
   <p:sldSz cx="12192000" cy="6858000"/>
   <p:notesSz cx="6858000" cy="9144000"/>
@@ -214,7 +215,7 @@
           <a:p>
             <a:fld id="{A079C53D-E9F5-4253-B088-62086649C9D2}" type="datetimeFigureOut">
               <a:rPr lang="en-US" smtClean="0"/>
-              <a:t>9/10/2024</a:t>
+              <a:t>9/27/2024</a:t>
             </a:fld>
             <a:endParaRPr lang="en-US"/>
           </a:p>
@@ -880,7 +881,7 @@
           <a:p>
             <a:fld id="{0E6B98C6-4E2D-4493-BB6F-B0B550CAA038}" type="datetimeFigureOut">
               <a:rPr lang="en-US" smtClean="0"/>
-              <a:t>9/10/2024</a:t>
+              <a:t>9/27/2024</a:t>
             </a:fld>
             <a:endParaRPr lang="en-US"/>
           </a:p>
@@ -1078,7 +1079,7 @@
           <a:p>
             <a:fld id="{0E6B98C6-4E2D-4493-BB6F-B0B550CAA038}" type="datetimeFigureOut">
               <a:rPr lang="en-US" smtClean="0"/>
-              <a:t>9/10/2024</a:t>
+              <a:t>9/27/2024</a:t>
             </a:fld>
             <a:endParaRPr lang="en-US"/>
           </a:p>
@@ -1286,7 +1287,7 @@
           <a:p>
             <a:fld id="{0E6B98C6-4E2D-4493-BB6F-B0B550CAA038}" type="datetimeFigureOut">
               <a:rPr lang="en-US" smtClean="0"/>
-              <a:t>9/10/2024</a:t>
+              <a:t>9/27/2024</a:t>
             </a:fld>
             <a:endParaRPr lang="en-US"/>
           </a:p>
@@ -1484,7 +1485,7 @@
           <a:p>
             <a:fld id="{0E6B98C6-4E2D-4493-BB6F-B0B550CAA038}" type="datetimeFigureOut">
               <a:rPr lang="en-US" smtClean="0"/>
-              <a:t>9/10/2024</a:t>
+              <a:t>9/27/2024</a:t>
             </a:fld>
             <a:endParaRPr lang="en-US"/>
           </a:p>
@@ -1759,7 +1760,7 @@
           <a:p>
             <a:fld id="{0E6B98C6-4E2D-4493-BB6F-B0B550CAA038}" type="datetimeFigureOut">
               <a:rPr lang="en-US" smtClean="0"/>
-              <a:t>9/10/2024</a:t>
+              <a:t>9/27/2024</a:t>
             </a:fld>
             <a:endParaRPr lang="en-US"/>
           </a:p>
@@ -2024,7 +2025,7 @@
           <a:p>
             <a:fld id="{0E6B98C6-4E2D-4493-BB6F-B0B550CAA038}" type="datetimeFigureOut">
               <a:rPr lang="en-US" smtClean="0"/>
-              <a:t>9/10/2024</a:t>
+              <a:t>9/27/2024</a:t>
             </a:fld>
             <a:endParaRPr lang="en-US"/>
           </a:p>
@@ -2436,7 +2437,7 @@
           <a:p>
             <a:fld id="{0E6B98C6-4E2D-4493-BB6F-B0B550CAA038}" type="datetimeFigureOut">
               <a:rPr lang="en-US" smtClean="0"/>
-              <a:t>9/10/2024</a:t>
+              <a:t>9/27/2024</a:t>
             </a:fld>
             <a:endParaRPr lang="en-US"/>
           </a:p>
@@ -2577,7 +2578,7 @@
           <a:p>
             <a:fld id="{0E6B98C6-4E2D-4493-BB6F-B0B550CAA038}" type="datetimeFigureOut">
               <a:rPr lang="en-US" smtClean="0"/>
-              <a:t>9/10/2024</a:t>
+              <a:t>9/27/2024</a:t>
             </a:fld>
             <a:endParaRPr lang="en-US"/>
           </a:p>
@@ -2690,7 +2691,7 @@
           <a:p>
             <a:fld id="{0E6B98C6-4E2D-4493-BB6F-B0B550CAA038}" type="datetimeFigureOut">
               <a:rPr lang="en-US" smtClean="0"/>
-              <a:t>9/10/2024</a:t>
+              <a:t>9/27/2024</a:t>
             </a:fld>
             <a:endParaRPr lang="en-US"/>
           </a:p>
@@ -3001,7 +3002,7 @@
           <a:p>
             <a:fld id="{0E6B98C6-4E2D-4493-BB6F-B0B550CAA038}" type="datetimeFigureOut">
               <a:rPr lang="en-US" smtClean="0"/>
-              <a:t>9/10/2024</a:t>
+              <a:t>9/27/2024</a:t>
             </a:fld>
             <a:endParaRPr lang="en-US"/>
           </a:p>
@@ -3289,7 +3290,7 @@
           <a:p>
             <a:fld id="{0E6B98C6-4E2D-4493-BB6F-B0B550CAA038}" type="datetimeFigureOut">
               <a:rPr lang="en-US" smtClean="0"/>
-              <a:t>9/10/2024</a:t>
+              <a:t>9/27/2024</a:t>
             </a:fld>
             <a:endParaRPr lang="en-US"/>
           </a:p>
@@ -3530,7 +3531,7 @@
           <a:p>
             <a:fld id="{0E6B98C6-4E2D-4493-BB6F-B0B550CAA038}" type="datetimeFigureOut">
               <a:rPr lang="en-US" smtClean="0"/>
-              <a:t>9/10/2024</a:t>
+              <a:t>9/27/2024</a:t>
             </a:fld>
             <a:endParaRPr lang="en-US"/>
           </a:p>
@@ -12742,6 +12743,848 @@
 </p:sld>
 </file>
 
+<file path=ppt/slides/slide19.xml><?xml version="1.0" encoding="utf-8"?>
+<p:sld xmlns:a="http://schemas.openxmlformats.org/drawingml/2006/main" xmlns:r="http://schemas.openxmlformats.org/officeDocument/2006/relationships" xmlns:p="http://schemas.openxmlformats.org/presentationml/2006/main">
+  <p:cSld>
+    <p:bg>
+      <p:bgPr>
+        <a:solidFill>
+          <a:srgbClr val="92D050"/>
+        </a:solidFill>
+        <a:effectLst/>
+      </p:bgPr>
+    </p:bg>
+    <p:spTree>
+      <p:nvGrpSpPr>
+        <p:cNvPr id="1" name=""/>
+        <p:cNvGrpSpPr/>
+        <p:nvPr/>
+      </p:nvGrpSpPr>
+      <p:grpSpPr>
+        <a:xfrm>
+          <a:off x="0" y="0"/>
+          <a:ext cx="0" cy="0"/>
+          <a:chOff x="0" y="0"/>
+          <a:chExt cx="0" cy="0"/>
+        </a:xfrm>
+      </p:grpSpPr>
+      <p:sp>
+        <p:nvSpPr>
+          <p:cNvPr id="3" name="Oval 2">
+            <a:extLst>
+              <a:ext uri="{FF2B5EF4-FFF2-40B4-BE49-F238E27FC236}">
+                <a16:creationId xmlns:a16="http://schemas.microsoft.com/office/drawing/2014/main" id="{48732F47-78DA-9C78-F787-5F6244741F94}"/>
+              </a:ext>
+            </a:extLst>
+          </p:cNvPr>
+          <p:cNvSpPr/>
+          <p:nvPr/>
+        </p:nvSpPr>
+        <p:spPr>
+          <a:xfrm>
+            <a:off x="2377440" y="1207008"/>
+            <a:ext cx="2121408" cy="2121408"/>
+          </a:xfrm>
+          <a:prstGeom prst="ellipse">
+            <a:avLst/>
+          </a:prstGeom>
+          <a:noFill/>
+          <a:ln w="38100">
+            <a:solidFill>
+              <a:srgbClr val="C00000"/>
+            </a:solidFill>
+          </a:ln>
+        </p:spPr>
+        <p:style>
+          <a:lnRef idx="2">
+            <a:schemeClr val="accent1">
+              <a:shade val="15000"/>
+            </a:schemeClr>
+          </a:lnRef>
+          <a:fillRef idx="1">
+            <a:schemeClr val="accent1"/>
+          </a:fillRef>
+          <a:effectRef idx="0">
+            <a:schemeClr val="accent1"/>
+          </a:effectRef>
+          <a:fontRef idx="minor">
+            <a:schemeClr val="lt1"/>
+          </a:fontRef>
+        </p:style>
+        <p:txBody>
+          <a:bodyPr rtlCol="0" anchor="ctr"/>
+          <a:lstStyle/>
+          <a:p>
+            <a:pPr algn="ctr"/>
+            <a:endParaRPr lang="en-US"/>
+          </a:p>
+        </p:txBody>
+      </p:sp>
+      <p:sp>
+        <p:nvSpPr>
+          <p:cNvPr id="4" name="Oval 3">
+            <a:extLst>
+              <a:ext uri="{FF2B5EF4-FFF2-40B4-BE49-F238E27FC236}">
+                <a16:creationId xmlns:a16="http://schemas.microsoft.com/office/drawing/2014/main" id="{F69EF27F-49E5-C0EE-FD35-D0593BF264FF}"/>
+              </a:ext>
+            </a:extLst>
+          </p:cNvPr>
+          <p:cNvSpPr/>
+          <p:nvPr/>
+        </p:nvSpPr>
+        <p:spPr>
+          <a:xfrm>
+            <a:off x="3076956" y="1906524"/>
+            <a:ext cx="722376" cy="722376"/>
+          </a:xfrm>
+          <a:prstGeom prst="ellipse">
+            <a:avLst/>
+          </a:prstGeom>
+          <a:solidFill>
+            <a:srgbClr val="FF0000"/>
+          </a:solidFill>
+          <a:ln w="38100">
+            <a:noFill/>
+          </a:ln>
+        </p:spPr>
+        <p:style>
+          <a:lnRef idx="2">
+            <a:schemeClr val="accent1">
+              <a:shade val="15000"/>
+            </a:schemeClr>
+          </a:lnRef>
+          <a:fillRef idx="1">
+            <a:schemeClr val="accent1"/>
+          </a:fillRef>
+          <a:effectRef idx="0">
+            <a:schemeClr val="accent1"/>
+          </a:effectRef>
+          <a:fontRef idx="minor">
+            <a:schemeClr val="lt1"/>
+          </a:fontRef>
+        </p:style>
+        <p:txBody>
+          <a:bodyPr rtlCol="0" anchor="ctr"/>
+          <a:lstStyle/>
+          <a:p>
+            <a:pPr algn="ctr"/>
+            <a:endParaRPr lang="en-US"/>
+          </a:p>
+        </p:txBody>
+      </p:sp>
+      <p:sp>
+        <p:nvSpPr>
+          <p:cNvPr id="5" name="Oval 4">
+            <a:extLst>
+              <a:ext uri="{FF2B5EF4-FFF2-40B4-BE49-F238E27FC236}">
+                <a16:creationId xmlns:a16="http://schemas.microsoft.com/office/drawing/2014/main" id="{B052DA2A-77DF-A752-55F6-B8B719C3489C}"/>
+              </a:ext>
+            </a:extLst>
+          </p:cNvPr>
+          <p:cNvSpPr/>
+          <p:nvPr/>
+        </p:nvSpPr>
+        <p:spPr>
+          <a:xfrm>
+            <a:off x="5373624" y="4241292"/>
+            <a:ext cx="722376" cy="722376"/>
+          </a:xfrm>
+          <a:prstGeom prst="ellipse">
+            <a:avLst/>
+          </a:prstGeom>
+          <a:solidFill>
+            <a:srgbClr val="9E0000"/>
+          </a:solidFill>
+          <a:ln w="38100">
+            <a:noFill/>
+          </a:ln>
+        </p:spPr>
+        <p:style>
+          <a:lnRef idx="2">
+            <a:schemeClr val="accent1">
+              <a:shade val="15000"/>
+            </a:schemeClr>
+          </a:lnRef>
+          <a:fillRef idx="1">
+            <a:schemeClr val="accent1"/>
+          </a:fillRef>
+          <a:effectRef idx="0">
+            <a:schemeClr val="accent1"/>
+          </a:effectRef>
+          <a:fontRef idx="minor">
+            <a:schemeClr val="lt1"/>
+          </a:fontRef>
+        </p:style>
+        <p:txBody>
+          <a:bodyPr rtlCol="0" anchor="ctr"/>
+          <a:lstStyle/>
+          <a:p>
+            <a:pPr algn="ctr"/>
+            <a:endParaRPr lang="en-US"/>
+          </a:p>
+        </p:txBody>
+      </p:sp>
+      <p:sp>
+        <p:nvSpPr>
+          <p:cNvPr id="6" name="Rectangle: Rounded Corners 5">
+            <a:extLst>
+              <a:ext uri="{FF2B5EF4-FFF2-40B4-BE49-F238E27FC236}">
+                <a16:creationId xmlns:a16="http://schemas.microsoft.com/office/drawing/2014/main" id="{1C7FD094-CE69-09BC-2CE1-1552E845F00D}"/>
+              </a:ext>
+            </a:extLst>
+          </p:cNvPr>
+          <p:cNvSpPr/>
+          <p:nvPr/>
+        </p:nvSpPr>
+        <p:spPr>
+          <a:xfrm>
+            <a:off x="6205728" y="1368831"/>
+            <a:ext cx="231648" cy="1371600"/>
+          </a:xfrm>
+          <a:prstGeom prst="roundRect">
+            <a:avLst>
+              <a:gd name="adj" fmla="val 50000"/>
+            </a:avLst>
+          </a:prstGeom>
+          <a:solidFill>
+            <a:schemeClr val="bg1"/>
+          </a:solidFill>
+          <a:ln>
+            <a:noFill/>
+          </a:ln>
+        </p:spPr>
+        <p:style>
+          <a:lnRef idx="2">
+            <a:schemeClr val="accent1">
+              <a:shade val="15000"/>
+            </a:schemeClr>
+          </a:lnRef>
+          <a:fillRef idx="1">
+            <a:schemeClr val="accent1"/>
+          </a:fillRef>
+          <a:effectRef idx="0">
+            <a:schemeClr val="accent1"/>
+          </a:effectRef>
+          <a:fontRef idx="minor">
+            <a:schemeClr val="lt1"/>
+          </a:fontRef>
+        </p:style>
+        <p:txBody>
+          <a:bodyPr rtlCol="0" anchor="ctr"/>
+          <a:lstStyle/>
+          <a:p>
+            <a:pPr algn="ctr"/>
+            <a:endParaRPr lang="en-US" dirty="0"/>
+          </a:p>
+        </p:txBody>
+      </p:sp>
+      <p:sp>
+        <p:nvSpPr>
+          <p:cNvPr id="9" name="Rectangle: Rounded Corners 8">
+            <a:extLst>
+              <a:ext uri="{FF2B5EF4-FFF2-40B4-BE49-F238E27FC236}">
+                <a16:creationId xmlns:a16="http://schemas.microsoft.com/office/drawing/2014/main" id="{A3060A11-8479-E656-85DD-A34559B1019B}"/>
+              </a:ext>
+            </a:extLst>
+          </p:cNvPr>
+          <p:cNvSpPr/>
+          <p:nvPr/>
+        </p:nvSpPr>
+        <p:spPr>
+          <a:xfrm rot="19640493">
+            <a:off x="6427556" y="1321074"/>
+            <a:ext cx="231648" cy="890016"/>
+          </a:xfrm>
+          <a:prstGeom prst="roundRect">
+            <a:avLst>
+              <a:gd name="adj" fmla="val 50000"/>
+            </a:avLst>
+          </a:prstGeom>
+          <a:solidFill>
+            <a:schemeClr val="bg1"/>
+          </a:solidFill>
+          <a:ln>
+            <a:noFill/>
+          </a:ln>
+        </p:spPr>
+        <p:style>
+          <a:lnRef idx="2">
+            <a:schemeClr val="accent1">
+              <a:shade val="15000"/>
+            </a:schemeClr>
+          </a:lnRef>
+          <a:fillRef idx="1">
+            <a:schemeClr val="accent1"/>
+          </a:fillRef>
+          <a:effectRef idx="0">
+            <a:schemeClr val="accent1"/>
+          </a:effectRef>
+          <a:fontRef idx="minor">
+            <a:schemeClr val="lt1"/>
+          </a:fontRef>
+        </p:style>
+        <p:txBody>
+          <a:bodyPr rtlCol="0" anchor="ctr"/>
+          <a:lstStyle/>
+          <a:p>
+            <a:pPr algn="ctr"/>
+            <a:endParaRPr lang="en-US"/>
+          </a:p>
+        </p:txBody>
+      </p:sp>
+      <p:sp>
+        <p:nvSpPr>
+          <p:cNvPr id="10" name="Rectangle: Rounded Corners 9">
+            <a:extLst>
+              <a:ext uri="{FF2B5EF4-FFF2-40B4-BE49-F238E27FC236}">
+                <a16:creationId xmlns:a16="http://schemas.microsoft.com/office/drawing/2014/main" id="{B8A27028-F89C-3D8D-59AC-D3750A8DFCA2}"/>
+              </a:ext>
+            </a:extLst>
+          </p:cNvPr>
+          <p:cNvSpPr/>
+          <p:nvPr/>
+        </p:nvSpPr>
+        <p:spPr>
+          <a:xfrm rot="1959507" flipH="1">
+            <a:off x="5980176" y="1324588"/>
+            <a:ext cx="231648" cy="890016"/>
+          </a:xfrm>
+          <a:prstGeom prst="roundRect">
+            <a:avLst>
+              <a:gd name="adj" fmla="val 50000"/>
+            </a:avLst>
+          </a:prstGeom>
+          <a:solidFill>
+            <a:schemeClr val="bg1"/>
+          </a:solidFill>
+          <a:ln>
+            <a:noFill/>
+          </a:ln>
+        </p:spPr>
+        <p:style>
+          <a:lnRef idx="2">
+            <a:schemeClr val="accent1">
+              <a:shade val="15000"/>
+            </a:schemeClr>
+          </a:lnRef>
+          <a:fillRef idx="1">
+            <a:schemeClr val="accent1"/>
+          </a:fillRef>
+          <a:effectRef idx="0">
+            <a:schemeClr val="accent1"/>
+          </a:effectRef>
+          <a:fontRef idx="minor">
+            <a:schemeClr val="lt1"/>
+          </a:fontRef>
+        </p:style>
+        <p:txBody>
+          <a:bodyPr rtlCol="0" anchor="ctr"/>
+          <a:lstStyle/>
+          <a:p>
+            <a:pPr algn="ctr"/>
+            <a:endParaRPr lang="en-US"/>
+          </a:p>
+        </p:txBody>
+      </p:sp>
+      <p:pic>
+        <p:nvPicPr>
+          <p:cNvPr id="11" name="Picture 10">
+            <a:extLst>
+              <a:ext uri="{FF2B5EF4-FFF2-40B4-BE49-F238E27FC236}">
+                <a16:creationId xmlns:a16="http://schemas.microsoft.com/office/drawing/2014/main" id="{4B8178CD-B8FF-1F55-AC6C-E71DBBEADFC0}"/>
+              </a:ext>
+            </a:extLst>
+          </p:cNvPr>
+          <p:cNvPicPr>
+            <a:picLocks noChangeAspect="1"/>
+          </p:cNvPicPr>
+          <p:nvPr/>
+        </p:nvPicPr>
+        <p:blipFill>
+          <a:blip r:embed="rId2"/>
+          <a:stretch>
+            <a:fillRect/>
+          </a:stretch>
+        </p:blipFill>
+        <p:spPr>
+          <a:xfrm>
+            <a:off x="5487395" y="4288917"/>
+            <a:ext cx="494833" cy="651096"/>
+          </a:xfrm>
+          <a:prstGeom prst="rect">
+            <a:avLst/>
+          </a:prstGeom>
+        </p:spPr>
+      </p:pic>
+      <p:pic>
+        <p:nvPicPr>
+          <p:cNvPr id="16" name="Picture 15">
+            <a:extLst>
+              <a:ext uri="{FF2B5EF4-FFF2-40B4-BE49-F238E27FC236}">
+                <a16:creationId xmlns:a16="http://schemas.microsoft.com/office/drawing/2014/main" id="{D6C5BB60-5D46-5B8C-2F79-5206BBC31221}"/>
+              </a:ext>
+            </a:extLst>
+          </p:cNvPr>
+          <p:cNvPicPr>
+            <a:picLocks noChangeAspect="1"/>
+          </p:cNvPicPr>
+          <p:nvPr/>
+        </p:nvPicPr>
+        <p:blipFill>
+          <a:blip r:embed="rId3"/>
+          <a:stretch>
+            <a:fillRect/>
+          </a:stretch>
+        </p:blipFill>
+        <p:spPr>
+          <a:xfrm>
+            <a:off x="5736305" y="3069305"/>
+            <a:ext cx="719390" cy="719390"/>
+          </a:xfrm>
+          <a:prstGeom prst="rect">
+            <a:avLst/>
+          </a:prstGeom>
+        </p:spPr>
+      </p:pic>
+      <p:sp>
+        <p:nvSpPr>
+          <p:cNvPr id="17" name="Oval 16">
+            <a:extLst>
+              <a:ext uri="{FF2B5EF4-FFF2-40B4-BE49-F238E27FC236}">
+                <a16:creationId xmlns:a16="http://schemas.microsoft.com/office/drawing/2014/main" id="{D24BA7B5-5084-8DB2-21FE-746D5D338CB7}"/>
+              </a:ext>
+            </a:extLst>
+          </p:cNvPr>
+          <p:cNvSpPr/>
+          <p:nvPr/>
+        </p:nvSpPr>
+        <p:spPr>
+          <a:xfrm>
+            <a:off x="7480660" y="4228305"/>
+            <a:ext cx="722376" cy="722376"/>
+          </a:xfrm>
+          <a:prstGeom prst="ellipse">
+            <a:avLst/>
+          </a:prstGeom>
+          <a:solidFill>
+            <a:srgbClr val="9E0000"/>
+          </a:solidFill>
+          <a:ln w="38100">
+            <a:noFill/>
+          </a:ln>
+        </p:spPr>
+        <p:style>
+          <a:lnRef idx="2">
+            <a:schemeClr val="accent1">
+              <a:shade val="15000"/>
+            </a:schemeClr>
+          </a:lnRef>
+          <a:fillRef idx="1">
+            <a:schemeClr val="accent1"/>
+          </a:fillRef>
+          <a:effectRef idx="0">
+            <a:schemeClr val="accent1"/>
+          </a:effectRef>
+          <a:fontRef idx="minor">
+            <a:schemeClr val="lt1"/>
+          </a:fontRef>
+        </p:style>
+        <p:txBody>
+          <a:bodyPr rtlCol="0" anchor="ctr"/>
+          <a:lstStyle/>
+          <a:p>
+            <a:pPr algn="ctr"/>
+            <a:endParaRPr lang="en-US"/>
+          </a:p>
+        </p:txBody>
+      </p:sp>
+      <p:sp>
+        <p:nvSpPr>
+          <p:cNvPr id="19" name="Freeform: Shape 18">
+            <a:extLst>
+              <a:ext uri="{FF2B5EF4-FFF2-40B4-BE49-F238E27FC236}">
+                <a16:creationId xmlns:a16="http://schemas.microsoft.com/office/drawing/2014/main" id="{F8C9DC3A-F4C7-E52F-4686-CC02E2E81D61}"/>
+              </a:ext>
+            </a:extLst>
+          </p:cNvPr>
+          <p:cNvSpPr/>
+          <p:nvPr/>
+        </p:nvSpPr>
+        <p:spPr>
+          <a:xfrm rot="10800000">
+            <a:off x="7685110" y="4383540"/>
+            <a:ext cx="294425" cy="411905"/>
+          </a:xfrm>
+          <a:custGeom>
+            <a:avLst/>
+            <a:gdLst>
+              <a:gd name="connsiteX0" fmla="*/ 263185 w 494833"/>
+              <a:gd name="connsiteY0" fmla="*/ 576455 h 692279"/>
+              <a:gd name="connsiteX1" fmla="*/ 263185 w 494833"/>
+              <a:gd name="connsiteY1" fmla="*/ 115824 h 692279"/>
+              <a:gd name="connsiteX2" fmla="*/ 379009 w 494833"/>
+              <a:gd name="connsiteY2" fmla="*/ 0 h 692279"/>
+              <a:gd name="connsiteX3" fmla="*/ 494833 w 494833"/>
+              <a:gd name="connsiteY3" fmla="*/ 115824 h 692279"/>
+              <a:gd name="connsiteX4" fmla="*/ 494833 w 494833"/>
+              <a:gd name="connsiteY4" fmla="*/ 576455 h 692279"/>
+              <a:gd name="connsiteX5" fmla="*/ 379009 w 494833"/>
+              <a:gd name="connsiteY5" fmla="*/ 692279 h 692279"/>
+              <a:gd name="connsiteX6" fmla="*/ 263185 w 494833"/>
+              <a:gd name="connsiteY6" fmla="*/ 576455 h 692279"/>
+              <a:gd name="connsiteX7" fmla="*/ 0 w 494833"/>
+              <a:gd name="connsiteY7" fmla="*/ 576455 h 692279"/>
+              <a:gd name="connsiteX8" fmla="*/ 0 w 494833"/>
+              <a:gd name="connsiteY8" fmla="*/ 115824 h 692279"/>
+              <a:gd name="connsiteX9" fmla="*/ 115824 w 494833"/>
+              <a:gd name="connsiteY9" fmla="*/ 0 h 692279"/>
+              <a:gd name="connsiteX10" fmla="*/ 231648 w 494833"/>
+              <a:gd name="connsiteY10" fmla="*/ 115824 h 692279"/>
+              <a:gd name="connsiteX11" fmla="*/ 231648 w 494833"/>
+              <a:gd name="connsiteY11" fmla="*/ 576455 h 692279"/>
+              <a:gd name="connsiteX12" fmla="*/ 115824 w 494833"/>
+              <a:gd name="connsiteY12" fmla="*/ 692279 h 692279"/>
+              <a:gd name="connsiteX13" fmla="*/ 0 w 494833"/>
+              <a:gd name="connsiteY13" fmla="*/ 576455 h 692279"/>
+            </a:gdLst>
+            <a:ahLst/>
+            <a:cxnLst>
+              <a:cxn ang="0">
+                <a:pos x="connsiteX0" y="connsiteY0"/>
+              </a:cxn>
+              <a:cxn ang="0">
+                <a:pos x="connsiteX1" y="connsiteY1"/>
+              </a:cxn>
+              <a:cxn ang="0">
+                <a:pos x="connsiteX2" y="connsiteY2"/>
+              </a:cxn>
+              <a:cxn ang="0">
+                <a:pos x="connsiteX3" y="connsiteY3"/>
+              </a:cxn>
+              <a:cxn ang="0">
+                <a:pos x="connsiteX4" y="connsiteY4"/>
+              </a:cxn>
+              <a:cxn ang="0">
+                <a:pos x="connsiteX5" y="connsiteY5"/>
+              </a:cxn>
+              <a:cxn ang="0">
+                <a:pos x="connsiteX6" y="connsiteY6"/>
+              </a:cxn>
+              <a:cxn ang="0">
+                <a:pos x="connsiteX7" y="connsiteY7"/>
+              </a:cxn>
+              <a:cxn ang="0">
+                <a:pos x="connsiteX8" y="connsiteY8"/>
+              </a:cxn>
+              <a:cxn ang="0">
+                <a:pos x="connsiteX9" y="connsiteY9"/>
+              </a:cxn>
+              <a:cxn ang="0">
+                <a:pos x="connsiteX10" y="connsiteY10"/>
+              </a:cxn>
+              <a:cxn ang="0">
+                <a:pos x="connsiteX11" y="connsiteY11"/>
+              </a:cxn>
+              <a:cxn ang="0">
+                <a:pos x="connsiteX12" y="connsiteY12"/>
+              </a:cxn>
+              <a:cxn ang="0">
+                <a:pos x="connsiteX13" y="connsiteY13"/>
+              </a:cxn>
+            </a:cxnLst>
+            <a:rect l="l" t="t" r="r" b="b"/>
+            <a:pathLst>
+              <a:path w="494833" h="692279">
+                <a:moveTo>
+                  <a:pt x="263185" y="576455"/>
+                </a:moveTo>
+                <a:lnTo>
+                  <a:pt x="263185" y="115824"/>
+                </a:lnTo>
+                <a:cubicBezTo>
+                  <a:pt x="263185" y="51856"/>
+                  <a:pt x="315041" y="0"/>
+                  <a:pt x="379009" y="0"/>
+                </a:cubicBezTo>
+                <a:cubicBezTo>
+                  <a:pt x="442977" y="0"/>
+                  <a:pt x="494833" y="51856"/>
+                  <a:pt x="494833" y="115824"/>
+                </a:cubicBezTo>
+                <a:lnTo>
+                  <a:pt x="494833" y="576455"/>
+                </a:lnTo>
+                <a:cubicBezTo>
+                  <a:pt x="494833" y="640423"/>
+                  <a:pt x="442977" y="692279"/>
+                  <a:pt x="379009" y="692279"/>
+                </a:cubicBezTo>
+                <a:cubicBezTo>
+                  <a:pt x="315041" y="692279"/>
+                  <a:pt x="263185" y="640423"/>
+                  <a:pt x="263185" y="576455"/>
+                </a:cubicBezTo>
+                <a:close/>
+                <a:moveTo>
+                  <a:pt x="0" y="576455"/>
+                </a:moveTo>
+                <a:lnTo>
+                  <a:pt x="0" y="115824"/>
+                </a:lnTo>
+                <a:cubicBezTo>
+                  <a:pt x="0" y="51856"/>
+                  <a:pt x="51856" y="0"/>
+                  <a:pt x="115824" y="0"/>
+                </a:cubicBezTo>
+                <a:cubicBezTo>
+                  <a:pt x="179792" y="0"/>
+                  <a:pt x="231648" y="51856"/>
+                  <a:pt x="231648" y="115824"/>
+                </a:cubicBezTo>
+                <a:lnTo>
+                  <a:pt x="231648" y="576455"/>
+                </a:lnTo>
+                <a:cubicBezTo>
+                  <a:pt x="231648" y="640423"/>
+                  <a:pt x="179792" y="692279"/>
+                  <a:pt x="115824" y="692279"/>
+                </a:cubicBezTo>
+                <a:cubicBezTo>
+                  <a:pt x="51856" y="692279"/>
+                  <a:pt x="0" y="640423"/>
+                  <a:pt x="0" y="576455"/>
+                </a:cubicBezTo>
+                <a:close/>
+              </a:path>
+            </a:pathLst>
+          </a:custGeom>
+          <a:solidFill>
+            <a:schemeClr val="bg1"/>
+          </a:solidFill>
+          <a:ln>
+            <a:noFill/>
+          </a:ln>
+        </p:spPr>
+        <p:style>
+          <a:lnRef idx="2">
+            <a:schemeClr val="accent1">
+              <a:shade val="15000"/>
+            </a:schemeClr>
+          </a:lnRef>
+          <a:fillRef idx="1">
+            <a:schemeClr val="accent1"/>
+          </a:fillRef>
+          <a:effectRef idx="0">
+            <a:schemeClr val="accent1"/>
+          </a:effectRef>
+          <a:fontRef idx="minor">
+            <a:schemeClr val="lt1"/>
+          </a:fontRef>
+        </p:style>
+        <p:txBody>
+          <a:bodyPr wrap="square" rtlCol="0" anchor="ctr">
+            <a:noAutofit/>
+          </a:bodyPr>
+          <a:lstStyle/>
+          <a:p>
+            <a:pPr algn="ctr"/>
+            <a:endParaRPr lang="en-US" dirty="0"/>
+          </a:p>
+        </p:txBody>
+      </p:sp>
+      <p:pic>
+        <p:nvPicPr>
+          <p:cNvPr id="20" name="Picture 19">
+            <a:extLst>
+              <a:ext uri="{FF2B5EF4-FFF2-40B4-BE49-F238E27FC236}">
+                <a16:creationId xmlns:a16="http://schemas.microsoft.com/office/drawing/2014/main" id="{A1E1D5A2-A614-FBB3-DA4C-D97D32AD680C}"/>
+              </a:ext>
+            </a:extLst>
+          </p:cNvPr>
+          <p:cNvPicPr>
+            <a:picLocks noChangeAspect="1"/>
+          </p:cNvPicPr>
+          <p:nvPr/>
+        </p:nvPicPr>
+        <p:blipFill>
+          <a:blip r:embed="rId4"/>
+          <a:stretch>
+            <a:fillRect/>
+          </a:stretch>
+        </p:blipFill>
+        <p:spPr>
+          <a:xfrm>
+            <a:off x="6543380" y="3069305"/>
+            <a:ext cx="725487" cy="719390"/>
+          </a:xfrm>
+          <a:prstGeom prst="rect">
+            <a:avLst/>
+          </a:prstGeom>
+        </p:spPr>
+      </p:pic>
+      <p:pic>
+        <p:nvPicPr>
+          <p:cNvPr id="21" name="Picture 20">
+            <a:extLst>
+              <a:ext uri="{FF2B5EF4-FFF2-40B4-BE49-F238E27FC236}">
+                <a16:creationId xmlns:a16="http://schemas.microsoft.com/office/drawing/2014/main" id="{94E35B1E-6C8E-04EB-AC7D-90EE20388FD2}"/>
+              </a:ext>
+            </a:extLst>
+          </p:cNvPr>
+          <p:cNvPicPr>
+            <a:picLocks noChangeAspect="1"/>
+          </p:cNvPicPr>
+          <p:nvPr/>
+        </p:nvPicPr>
+        <p:blipFill>
+          <a:blip r:embed="rId2"/>
+          <a:stretch>
+            <a:fillRect/>
+          </a:stretch>
+        </p:blipFill>
+        <p:spPr>
+          <a:xfrm>
+            <a:off x="7356552" y="1542351"/>
+            <a:ext cx="1042506" cy="1371719"/>
+          </a:xfrm>
+          <a:prstGeom prst="rect">
+            <a:avLst/>
+          </a:prstGeom>
+        </p:spPr>
+      </p:pic>
+      <p:pic>
+        <p:nvPicPr>
+          <p:cNvPr id="22" name="Picture 21">
+            <a:extLst>
+              <a:ext uri="{FF2B5EF4-FFF2-40B4-BE49-F238E27FC236}">
+                <a16:creationId xmlns:a16="http://schemas.microsoft.com/office/drawing/2014/main" id="{DE9D63CD-54A5-21AC-B29A-D2EA4045015C}"/>
+              </a:ext>
+            </a:extLst>
+          </p:cNvPr>
+          <p:cNvPicPr>
+            <a:picLocks noChangeAspect="1"/>
+          </p:cNvPicPr>
+          <p:nvPr/>
+        </p:nvPicPr>
+        <p:blipFill>
+          <a:blip r:embed="rId2"/>
+          <a:stretch>
+            <a:fillRect/>
+          </a:stretch>
+        </p:blipFill>
+        <p:spPr>
+          <a:xfrm rot="5400000">
+            <a:off x="7939779" y="2124357"/>
+            <a:ext cx="1042506" cy="1371719"/>
+          </a:xfrm>
+          <a:prstGeom prst="rect">
+            <a:avLst/>
+          </a:prstGeom>
+        </p:spPr>
+      </p:pic>
+      <p:pic>
+        <p:nvPicPr>
+          <p:cNvPr id="23" name="Picture 22">
+            <a:extLst>
+              <a:ext uri="{FF2B5EF4-FFF2-40B4-BE49-F238E27FC236}">
+                <a16:creationId xmlns:a16="http://schemas.microsoft.com/office/drawing/2014/main" id="{F64DAF32-6F5B-030F-B33B-A1BF1B4E5FAD}"/>
+              </a:ext>
+            </a:extLst>
+          </p:cNvPr>
+          <p:cNvPicPr>
+            <a:picLocks noChangeAspect="1"/>
+          </p:cNvPicPr>
+          <p:nvPr/>
+        </p:nvPicPr>
+        <p:blipFill>
+          <a:blip r:embed="rId2"/>
+          <a:stretch>
+            <a:fillRect/>
+          </a:stretch>
+        </p:blipFill>
+        <p:spPr>
+          <a:xfrm rot="16200000" flipH="1">
+            <a:off x="6782850" y="2122156"/>
+            <a:ext cx="1042506" cy="1371719"/>
+          </a:xfrm>
+          <a:prstGeom prst="rect">
+            <a:avLst/>
+          </a:prstGeom>
+        </p:spPr>
+      </p:pic>
+      <p:pic>
+        <p:nvPicPr>
+          <p:cNvPr id="24" name="Picture 23">
+            <a:extLst>
+              <a:ext uri="{FF2B5EF4-FFF2-40B4-BE49-F238E27FC236}">
+                <a16:creationId xmlns:a16="http://schemas.microsoft.com/office/drawing/2014/main" id="{5D44053F-13C8-69AE-8197-2A5408BDE832}"/>
+              </a:ext>
+            </a:extLst>
+          </p:cNvPr>
+          <p:cNvPicPr>
+            <a:picLocks noChangeAspect="1"/>
+          </p:cNvPicPr>
+          <p:nvPr/>
+        </p:nvPicPr>
+        <p:blipFill>
+          <a:blip r:embed="rId2"/>
+          <a:stretch>
+            <a:fillRect/>
+          </a:stretch>
+        </p:blipFill>
+        <p:spPr>
+          <a:xfrm flipV="1">
+            <a:off x="7374871" y="2759127"/>
+            <a:ext cx="1042506" cy="1371719"/>
+          </a:xfrm>
+          <a:prstGeom prst="rect">
+            <a:avLst/>
+          </a:prstGeom>
+        </p:spPr>
+      </p:pic>
+      <p:pic>
+        <p:nvPicPr>
+          <p:cNvPr id="25" name="Picture 24">
+            <a:extLst>
+              <a:ext uri="{FF2B5EF4-FFF2-40B4-BE49-F238E27FC236}">
+                <a16:creationId xmlns:a16="http://schemas.microsoft.com/office/drawing/2014/main" id="{E214337D-03C8-6F21-BF4B-A737D2BC97AF}"/>
+              </a:ext>
+            </a:extLst>
+          </p:cNvPr>
+          <p:cNvPicPr>
+            <a:picLocks noChangeAspect="1"/>
+          </p:cNvPicPr>
+          <p:nvPr/>
+        </p:nvPicPr>
+        <p:blipFill>
+          <a:blip r:embed="rId5"/>
+          <a:stretch>
+            <a:fillRect/>
+          </a:stretch>
+        </p:blipFill>
+        <p:spPr>
+          <a:xfrm>
+            <a:off x="3205617" y="2054631"/>
+            <a:ext cx="456099" cy="468218"/>
+          </a:xfrm>
+          <a:prstGeom prst="rect">
+            <a:avLst/>
+          </a:prstGeom>
+        </p:spPr>
+      </p:pic>
+    </p:spTree>
+    <p:extLst>
+      <p:ext uri="{BB962C8B-B14F-4D97-AF65-F5344CB8AC3E}">
+        <p14:creationId xmlns:p14="http://schemas.microsoft.com/office/powerpoint/2010/main" val="1979871144"/>
+      </p:ext>
+    </p:extLst>
+  </p:cSld>
+  <p:clrMapOvr>
+    <a:masterClrMapping/>
+  </p:clrMapOvr>
+</p:sld>
+</file>
+
 <file path=ppt/slides/slide2.xml><?xml version="1.0" encoding="utf-8"?>
 <p:sld xmlns:a="http://schemas.openxmlformats.org/drawingml/2006/main" xmlns:r="http://schemas.openxmlformats.org/officeDocument/2006/relationships" xmlns:p="http://schemas.openxmlformats.org/presentationml/2006/main">
   <p:cSld>
@@ -14189,7 +15032,7 @@
         </p:blipFill>
         <p:spPr>
           <a:xfrm>
-            <a:off x="11572680" y="2464126"/>
+            <a:off x="13313955" y="1426556"/>
             <a:ext cx="4602879" cy="5096698"/>
           </a:xfrm>
           <a:prstGeom prst="rect">

</xml_diff>